<commit_message>
já só falta por os requisitos
</commit_message>
<xml_diff>
--- a/Aula 05/G10 - Apresentacao - Lab05.pptx
+++ b/Aula 05/G10 - Apresentacao - Lab05.pptx
@@ -5,7 +5,7 @@
     <p:sldMasterId id="2147483660" r:id="rId1"/>
   </p:sldMasterIdLst>
   <p:notesMasterIdLst>
-    <p:notesMasterId r:id="rId14"/>
+    <p:notesMasterId r:id="rId15"/>
   </p:notesMasterIdLst>
   <p:sldIdLst>
     <p:sldId id="256" r:id="rId2"/>
@@ -20,6 +20,7 @@
     <p:sldId id="270" r:id="rId11"/>
     <p:sldId id="267" r:id="rId12"/>
     <p:sldId id="271" r:id="rId13"/>
+    <p:sldId id="272" r:id="rId14"/>
   </p:sldIdLst>
   <p:sldSz cx="9144000" cy="6858000" type="screen4x3"/>
   <p:notesSz cx="6858000" cy="9144000"/>
@@ -219,7 +220,7 @@
           <a:p>
             <a:fld id="{A0410F9C-3A27-C84F-B27D-9342140F08DB}" type="datetimeFigureOut">
               <a:rPr lang="pt-PT" smtClean="0"/>
-              <a:t>28/10/15</a:t>
+              <a:t>29/10/15</a:t>
             </a:fld>
             <a:endParaRPr lang="pt-PT"/>
           </a:p>
@@ -1024,7 +1025,7 @@
           <a:p>
             <a:fld id="{D728701E-CAF4-4159-9B3E-41C86DFFA30D}" type="datetimeFigureOut">
               <a:rPr lang="en-US" smtClean="0"/>
-              <a:t>10/28/15</a:t>
+              <a:t>10/29/15</a:t>
             </a:fld>
             <a:endParaRPr lang="en-US"/>
           </a:p>
@@ -1478,7 +1479,7 @@
           <a:p>
             <a:fld id="{D728701E-CAF4-4159-9B3E-41C86DFFA30D}" type="datetimeFigureOut">
               <a:rPr lang="en-US" smtClean="0"/>
-              <a:t>10/28/15</a:t>
+              <a:t>10/29/15</a:t>
             </a:fld>
             <a:endParaRPr lang="en-US"/>
           </a:p>
@@ -2021,7 +2022,7 @@
           <a:p>
             <a:fld id="{D728701E-CAF4-4159-9B3E-41C86DFFA30D}" type="datetimeFigureOut">
               <a:rPr lang="en-US" smtClean="0"/>
-              <a:t>10/28/15</a:t>
+              <a:t>10/29/15</a:t>
             </a:fld>
             <a:endParaRPr lang="en-US"/>
           </a:p>
@@ -2157,7 +2158,7 @@
           <a:p>
             <a:fld id="{D728701E-CAF4-4159-9B3E-41C86DFFA30D}" type="datetimeFigureOut">
               <a:rPr lang="en-US" smtClean="0"/>
-              <a:t>10/28/15</a:t>
+              <a:t>10/29/15</a:t>
             </a:fld>
             <a:endParaRPr lang="en-US"/>
           </a:p>
@@ -2495,7 +2496,7 @@
           <a:p>
             <a:fld id="{D728701E-CAF4-4159-9B3E-41C86DFFA30D}" type="datetimeFigureOut">
               <a:rPr lang="en-US" smtClean="0"/>
-              <a:t>10/28/15</a:t>
+              <a:t>10/29/15</a:t>
             </a:fld>
             <a:endParaRPr lang="en-US"/>
           </a:p>
@@ -2821,7 +2822,7 @@
           <a:p>
             <a:fld id="{D728701E-CAF4-4159-9B3E-41C86DFFA30D}" type="datetimeFigureOut">
               <a:rPr lang="en-US" smtClean="0"/>
-              <a:t>10/28/15</a:t>
+              <a:t>10/29/15</a:t>
             </a:fld>
             <a:endParaRPr lang="en-US"/>
           </a:p>
@@ -3119,7 +3120,7 @@
           <a:p>
             <a:fld id="{D728701E-CAF4-4159-9B3E-41C86DFFA30D}" type="datetimeFigureOut">
               <a:rPr lang="en-US" smtClean="0"/>
-              <a:t>10/28/15</a:t>
+              <a:t>10/29/15</a:t>
             </a:fld>
             <a:endParaRPr lang="en-US"/>
           </a:p>
@@ -3506,7 +3507,7 @@
           <a:p>
             <a:fld id="{D728701E-CAF4-4159-9B3E-41C86DFFA30D}" type="datetimeFigureOut">
               <a:rPr lang="en-US" smtClean="0"/>
-              <a:t>10/28/15</a:t>
+              <a:t>10/29/15</a:t>
             </a:fld>
             <a:endParaRPr lang="en-US"/>
           </a:p>
@@ -3926,7 +3927,7 @@
           <a:p>
             <a:fld id="{D728701E-CAF4-4159-9B3E-41C86DFFA30D}" type="datetimeFigureOut">
               <a:rPr lang="en-US" smtClean="0"/>
-              <a:t>10/28/15</a:t>
+              <a:t>10/29/15</a:t>
             </a:fld>
             <a:endParaRPr lang="en-US"/>
           </a:p>
@@ -4474,7 +4475,7 @@
           <a:p>
             <a:fld id="{D728701E-CAF4-4159-9B3E-41C86DFFA30D}" type="datetimeFigureOut">
               <a:rPr lang="en-US" smtClean="0"/>
-              <a:t>10/28/15</a:t>
+              <a:t>10/29/15</a:t>
             </a:fld>
             <a:endParaRPr lang="en-US"/>
           </a:p>
@@ -4832,7 +4833,7 @@
           <a:p>
             <a:fld id="{D728701E-CAF4-4159-9B3E-41C86DFFA30D}" type="datetimeFigureOut">
               <a:rPr lang="en-US" smtClean="0"/>
-              <a:t>10/28/15</a:t>
+              <a:t>10/29/15</a:t>
             </a:fld>
             <a:endParaRPr lang="en-US"/>
           </a:p>
@@ -5047,7 +5048,7 @@
           <a:p>
             <a:fld id="{D728701E-CAF4-4159-9B3E-41C86DFFA30D}" type="datetimeFigureOut">
               <a:rPr lang="en-US" smtClean="0"/>
-              <a:t>10/28/15</a:t>
+              <a:t>10/29/15</a:t>
             </a:fld>
             <a:endParaRPr lang="en-US"/>
           </a:p>
@@ -5354,7 +5355,7 @@
           <a:p>
             <a:fld id="{D728701E-CAF4-4159-9B3E-41C86DFFA30D}" type="datetimeFigureOut">
               <a:rPr lang="en-US" smtClean="0"/>
-              <a:t>10/28/15</a:t>
+              <a:t>10/29/15</a:t>
             </a:fld>
             <a:endParaRPr lang="en-US"/>
           </a:p>
@@ -5610,7 +5611,7 @@
           <a:p>
             <a:fld id="{D728701E-CAF4-4159-9B3E-41C86DFFA30D}" type="datetimeFigureOut">
               <a:rPr lang="en-US" smtClean="0"/>
-              <a:t>10/28/15</a:t>
+              <a:t>10/29/15</a:t>
             </a:fld>
             <a:endParaRPr lang="en-US"/>
           </a:p>
@@ -5999,7 +6000,7 @@
           <a:p>
             <a:fld id="{D728701E-CAF4-4159-9B3E-41C86DFFA30D}" type="datetimeFigureOut">
               <a:rPr lang="en-US" smtClean="0"/>
-              <a:t>10/28/15</a:t>
+              <a:t>10/29/15</a:t>
             </a:fld>
             <a:endParaRPr lang="en-US"/>
           </a:p>
@@ -6588,7 +6589,7 @@
           <a:p>
             <a:fld id="{D728701E-CAF4-4159-9B3E-41C86DFFA30D}" type="datetimeFigureOut">
               <a:rPr lang="en-US" smtClean="0"/>
-              <a:t>10/28/15</a:t>
+              <a:t>10/29/15</a:t>
             </a:fld>
             <a:endParaRPr lang="en-US"/>
           </a:p>
@@ -7103,7 +7104,7 @@
           <a:p>
             <a:fld id="{D728701E-CAF4-4159-9B3E-41C86DFFA30D}" type="datetimeFigureOut">
               <a:rPr lang="en-US" smtClean="0"/>
-              <a:t>10/28/15</a:t>
+              <a:t>10/29/15</a:t>
             </a:fld>
             <a:endParaRPr lang="en-US"/>
           </a:p>
@@ -7476,7 +7477,7 @@
           <a:p>
             <a:fld id="{D728701E-CAF4-4159-9B3E-41C86DFFA30D}" type="datetimeFigureOut">
               <a:rPr lang="en-US" smtClean="0"/>
-              <a:t>10/28/15</a:t>
+              <a:t>10/29/15</a:t>
             </a:fld>
             <a:endParaRPr lang="en-US"/>
           </a:p>
@@ -7875,7 +7876,7 @@
           <a:p>
             <a:fld id="{D728701E-CAF4-4159-9B3E-41C86DFFA30D}" type="datetimeFigureOut">
               <a:rPr lang="en-US" smtClean="0"/>
-              <a:t>10/28/15</a:t>
+              <a:t>10/29/15</a:t>
             </a:fld>
             <a:endParaRPr lang="en-US"/>
           </a:p>
@@ -8295,7 +8296,7 @@
           <a:p>
             <a:fld id="{D728701E-CAF4-4159-9B3E-41C86DFFA30D}" type="datetimeFigureOut">
               <a:rPr lang="en-US" smtClean="0"/>
-              <a:t>10/28/15</a:t>
+              <a:t>10/29/15</a:t>
             </a:fld>
             <a:endParaRPr lang="en-US"/>
           </a:p>
@@ -8678,7 +8679,7 @@
           <a:p>
             <a:fld id="{D728701E-CAF4-4159-9B3E-41C86DFFA30D}" type="datetimeFigureOut">
               <a:rPr lang="en-US" smtClean="0"/>
-              <a:t>10/28/15</a:t>
+              <a:t>10/29/15</a:t>
             </a:fld>
             <a:endParaRPr lang="en-US"/>
           </a:p>
@@ -9657,13 +9658,20 @@
                 </a:solidFill>
                 <a:latin typeface="+mj-lt"/>
               </a:rPr>
-              <a:t>Personas Participantes</a:t>
+              <a:t>Personas Participantes: </a:t>
+            </a:r>
+            <a:r>
+              <a:rPr lang="pt-PT" sz="2400" dirty="0" smtClean="0">
+                <a:solidFill>
+                  <a:schemeClr val="tx1"/>
+                </a:solidFill>
+                <a:latin typeface="+mj-lt"/>
+              </a:rPr>
+              <a:t>Sr. João</a:t>
             </a:r>
             <a:endParaRPr lang="pt-PT" sz="2400" dirty="0">
               <a:solidFill>
-                <a:schemeClr val="bg1">
-                  <a:lumMod val="65000"/>
-                </a:schemeClr>
+                <a:schemeClr val="tx1"/>
               </a:solidFill>
               <a:latin typeface="+mj-lt"/>
             </a:endParaRPr>
@@ -9682,8 +9690,8 @@
         </p:nvSpPr>
         <p:spPr>
           <a:xfrm>
-            <a:off x="391596" y="1981200"/>
-            <a:ext cx="8194264" cy="4324597"/>
+            <a:off x="296885" y="2078181"/>
+            <a:ext cx="8550232" cy="4655127"/>
           </a:xfrm>
         </p:spPr>
         <p:txBody>
@@ -9691,6 +9699,98 @@
             <a:noAutofit/>
           </a:bodyPr>
           <a:lstStyle/>
+          <a:p>
+            <a:pPr marL="0" indent="0">
+              <a:lnSpc>
+                <a:spcPct val="150000"/>
+              </a:lnSpc>
+              <a:spcBef>
+                <a:spcPts val="800"/>
+              </a:spcBef>
+              <a:buNone/>
+            </a:pPr>
+            <a:r>
+              <a:rPr lang="pt-PT" sz="1400" dirty="0" smtClean="0"/>
+              <a:t>	</a:t>
+            </a:r>
+            <a:r>
+              <a:rPr lang="pt-PT" sz="1300" dirty="0" smtClean="0"/>
+              <a:t>O Sr. João faz uma </a:t>
+            </a:r>
+            <a:r>
+              <a:rPr lang="pt-PT" sz="1300" dirty="0"/>
+              <a:t>pesquisa e </a:t>
+            </a:r>
+            <a:r>
+              <a:rPr lang="pt-PT" sz="1300" dirty="0" smtClean="0"/>
+              <a:t>rapidamente encontra </a:t>
+            </a:r>
+            <a:r>
+              <a:rPr lang="pt-PT" sz="1300" dirty="0"/>
+              <a:t>uma plataforma de aprendizagem, que </a:t>
+            </a:r>
+            <a:r>
+              <a:rPr lang="pt-PT" sz="1300" dirty="0" smtClean="0"/>
+              <a:t>explora, </a:t>
+            </a:r>
+            <a:r>
+              <a:rPr lang="pt-PT" sz="1300" dirty="0"/>
+              <a:t>e verifica que oferece um curso de alemão. Embora tenha alguma experiência a fazer compras online, utiliza a janela de chat do ecrã inicial para averiguar a legitimidade da plataforma, </a:t>
+            </a:r>
+            <a:r>
+              <a:rPr lang="pt-PT" sz="1300" dirty="0" smtClean="0"/>
+              <a:t>quanto </a:t>
+            </a:r>
+            <a:r>
+              <a:rPr lang="pt-PT" sz="1300" dirty="0"/>
+              <a:t>à informação de pagamento </a:t>
+            </a:r>
+            <a:r>
+              <a:rPr lang="pt-PT" sz="1300" dirty="0" smtClean="0"/>
+              <a:t>que deve </a:t>
+            </a:r>
+            <a:r>
+              <a:rPr lang="pt-PT" sz="1300" dirty="0"/>
+              <a:t>inserir. Depois de satisfeito, </a:t>
+            </a:r>
+            <a:r>
+              <a:rPr lang="pt-PT" sz="1300" dirty="0" smtClean="0"/>
+              <a:t>vai ainda explorar outro </a:t>
+            </a:r>
+            <a:r>
+              <a:rPr lang="pt-PT" sz="1300" dirty="0"/>
+              <a:t>problema: visto ter pouca disponibilidade para um curso intensivo, não lhe interessa aprender apenas algumas palavras numa sessão e depois não poder revê-las caso só volte na semana seguinte. </a:t>
+            </a:r>
+            <a:r>
+              <a:rPr lang="pt-PT" sz="1300" dirty="0" smtClean="0"/>
+              <a:t>Desta forma consulta a página principal do curso e verifica que o professor tem uma área onde coloca resumos. Satisfeito com o que vê verifica ainda que a página apresenta um vídeo introdutório com a explicação de como irá decorrer o curso e o material que o professor irá disponibilizar. Inteiramente convencido, </a:t>
+            </a:r>
+            <a:r>
+              <a:rPr lang="pt-PT" sz="1300" dirty="0" err="1" smtClean="0"/>
+              <a:t>efectua</a:t>
+            </a:r>
+            <a:r>
+              <a:rPr lang="pt-PT" sz="1300" dirty="0" smtClean="0"/>
+              <a:t> o pagamento do curso. A plataforma, antes do pagamento pede para o Sr. João que se registe, e tal como está habituado, procede ao preenchimento do formulário de inscrição. </a:t>
+            </a:r>
+            <a:r>
+              <a:rPr lang="pt-PT" sz="1300" dirty="0"/>
+              <a:t>D</a:t>
+            </a:r>
+            <a:r>
+              <a:rPr lang="pt-PT" sz="1300" dirty="0" smtClean="0"/>
+              <a:t>epois de preenchido o registo aparece a plataforma de pagamento, escolhe a opção de cartão de crédito, insere os dados e </a:t>
+            </a:r>
+            <a:r>
+              <a:rPr lang="pt-PT" sz="1300" dirty="0" err="1" smtClean="0"/>
+              <a:t>efectua</a:t>
+            </a:r>
+            <a:r>
+              <a:rPr lang="pt-PT" sz="1300" dirty="0" smtClean="0"/>
+              <a:t> o pagamento. Depois deste passos o Sr. João volta para a página do curso em que se inscreveu e vê que todos os conteúdos do curso estão já disponíveis. É então que inicia o seu curso, começando por visualizar o vídeo da lição nº1, presente na lista de vídeos das aulas.</a:t>
+            </a:r>
+            <a:endParaRPr lang="pt-PT" sz="1300" dirty="0"/>
+          </a:p>
           <a:p>
             <a:pPr>
               <a:lnSpc>
@@ -9771,7 +9871,7 @@
           <a:p>
             <a:r>
               <a:rPr lang="pt-PT" sz="3200" dirty="0" smtClean="0"/>
-              <a:t>Descrição formal dos requisitos</a:t>
+              <a:t>Descrição formal de alguns requisitos</a:t>
             </a:r>
             <a:endParaRPr lang="pt-PT" sz="3200" dirty="0"/>
           </a:p>
@@ -9909,7 +10009,7 @@
           <a:p>
             <a:r>
               <a:rPr lang="pt-PT" dirty="0" smtClean="0"/>
-              <a:t>Requisitos				</a:t>
+              <a:t>Requisitos					1/2				</a:t>
             </a:r>
             <a:r>
               <a:rPr lang="pt-PT" dirty="0"/>
@@ -10178,8 +10278,8 @@
         </p:nvSpPr>
         <p:spPr>
           <a:xfrm>
-            <a:off x="391596" y="1981200"/>
-            <a:ext cx="8194264" cy="4324597"/>
+            <a:off x="391595" y="1981200"/>
+            <a:ext cx="8419895" cy="4692732"/>
           </a:xfrm>
         </p:spPr>
         <p:txBody>
@@ -10196,7 +10296,27 @@
                 <a:spcPts val="800"/>
               </a:spcBef>
             </a:pPr>
-            <a:endParaRPr lang="pt-PT" sz="1400" dirty="0">
+            <a:r>
+              <a:rPr lang="pt-PT" sz="1600" dirty="0" smtClean="0">
+                <a:solidFill>
+                  <a:srgbClr val="00000A"/>
+                </a:solidFill>
+                <a:ea typeface="Cambria" charset="0"/>
+                <a:cs typeface="Cambria" charset="0"/>
+              </a:rPr>
+              <a:t>Funcionais</a:t>
+            </a:r>
+          </a:p>
+          <a:p>
+            <a:pPr>
+              <a:lnSpc>
+                <a:spcPct val="150000"/>
+              </a:lnSpc>
+              <a:spcBef>
+                <a:spcPts val="800"/>
+              </a:spcBef>
+            </a:pPr>
+            <a:endParaRPr lang="pt-PT" sz="1600" dirty="0" smtClean="0">
               <a:solidFill>
                 <a:srgbClr val="00000A"/>
               </a:solidFill>
@@ -10204,12 +10324,512 @@
               <a:cs typeface="Cambria" charset="0"/>
             </a:endParaRPr>
           </a:p>
+          <a:p>
+            <a:pPr>
+              <a:lnSpc>
+                <a:spcPct val="150000"/>
+              </a:lnSpc>
+              <a:spcBef>
+                <a:spcPts val="800"/>
+              </a:spcBef>
+            </a:pPr>
+            <a:r>
+              <a:rPr lang="pt-PT" sz="1600" dirty="0" smtClean="0">
+                <a:solidFill>
+                  <a:srgbClr val="00000A"/>
+                </a:solidFill>
+                <a:ea typeface="Cambria" charset="0"/>
+                <a:cs typeface="Cambria" charset="0"/>
+              </a:rPr>
+              <a:t>Usabilidade</a:t>
+            </a:r>
+          </a:p>
+          <a:p>
+            <a:pPr>
+              <a:lnSpc>
+                <a:spcPct val="150000"/>
+              </a:lnSpc>
+              <a:spcBef>
+                <a:spcPts val="800"/>
+              </a:spcBef>
+            </a:pPr>
+            <a:endParaRPr lang="pt-PT" sz="1600" dirty="0" smtClean="0">
+              <a:solidFill>
+                <a:srgbClr val="00000A"/>
+              </a:solidFill>
+              <a:ea typeface="Cambria" charset="0"/>
+              <a:cs typeface="Cambria" charset="0"/>
+            </a:endParaRPr>
+          </a:p>
+          <a:p>
+            <a:pPr marL="0" indent="0">
+              <a:lnSpc>
+                <a:spcPct val="150000"/>
+              </a:lnSpc>
+              <a:spcBef>
+                <a:spcPts val="800"/>
+              </a:spcBef>
+              <a:buNone/>
+            </a:pPr>
+            <a:endParaRPr lang="pt-PT" sz="1600" dirty="0" smtClean="0">
+              <a:solidFill>
+                <a:srgbClr val="00000A"/>
+              </a:solidFill>
+              <a:ea typeface="Cambria" charset="0"/>
+              <a:cs typeface="Cambria" charset="0"/>
+            </a:endParaRPr>
+          </a:p>
         </p:txBody>
       </p:sp>
     </p:spTree>
     <p:extLst>
       <p:ext uri="{BB962C8B-B14F-4D97-AF65-F5344CB8AC3E}">
         <p14:creationId xmlns:p14="http://schemas.microsoft.com/office/powerpoint/2010/main" val="296120015"/>
+      </p:ext>
+    </p:extLst>
+  </p:cSld>
+  <p:clrMapOvr>
+    <a:masterClrMapping/>
+  </p:clrMapOvr>
+  <p:timing>
+    <p:tnLst>
+      <p:par>
+        <p:cTn id="1" dur="indefinite" restart="never" nodeType="tmRoot"/>
+      </p:par>
+    </p:tnLst>
+  </p:timing>
+</p:sld>
+</file>
+
+<file path=ppt/slides/slide13.xml><?xml version="1.0" encoding="utf-8"?>
+<p:sld xmlns:a="http://schemas.openxmlformats.org/drawingml/2006/main" xmlns:r="http://schemas.openxmlformats.org/officeDocument/2006/relationships" xmlns:p="http://schemas.openxmlformats.org/presentationml/2006/main">
+  <p:cSld>
+    <p:spTree>
+      <p:nvGrpSpPr>
+        <p:cNvPr id="1" name=""/>
+        <p:cNvGrpSpPr/>
+        <p:nvPr/>
+      </p:nvGrpSpPr>
+      <p:grpSpPr>
+        <a:xfrm>
+          <a:off x="0" y="0"/>
+          <a:ext cx="0" cy="0"/>
+          <a:chOff x="0" y="0"/>
+          <a:chExt cx="0" cy="0"/>
+        </a:xfrm>
+      </p:grpSpPr>
+      <p:sp>
+        <p:nvSpPr>
+          <p:cNvPr id="2" name="Title 1"/>
+          <p:cNvSpPr>
+            <a:spLocks noGrp="1"/>
+          </p:cNvSpPr>
+          <p:nvPr>
+            <p:ph type="title"/>
+          </p:nvPr>
+        </p:nvSpPr>
+        <p:spPr/>
+        <p:txBody>
+          <a:bodyPr/>
+          <a:lstStyle/>
+          <a:p>
+            <a:r>
+              <a:rPr lang="pt-PT" dirty="0" smtClean="0"/>
+              <a:t>Requisitos					2/2				</a:t>
+            </a:r>
+            <a:r>
+              <a:rPr lang="pt-PT" dirty="0"/>
+              <a:t>	</a:t>
+            </a:r>
+          </a:p>
+        </p:txBody>
+      </p:sp>
+      <p:sp>
+        <p:nvSpPr>
+          <p:cNvPr id="5" name="Subtitle 2"/>
+          <p:cNvSpPr txBox="1">
+            <a:spLocks/>
+          </p:cNvSpPr>
+          <p:nvPr/>
+        </p:nvSpPr>
+        <p:spPr>
+          <a:xfrm>
+            <a:off x="498473" y="1142999"/>
+            <a:ext cx="7556313" cy="838201"/>
+          </a:xfrm>
+          <a:prstGeom prst="rect">
+            <a:avLst/>
+          </a:prstGeom>
+        </p:spPr>
+        <p:txBody>
+          <a:bodyPr vert="horz" lIns="91440" tIns="45720" rIns="91440" bIns="45720" rtlCol="0">
+            <a:normAutofit/>
+          </a:bodyPr>
+          <a:lstStyle>
+            <a:lvl1pPr marL="228600" indent="-228600" algn="l" defTabSz="914400" rtl="0" eaLnBrk="1" latinLnBrk="0" hangingPunct="1">
+              <a:spcBef>
+                <a:spcPts val="2000"/>
+              </a:spcBef>
+              <a:buClr>
+                <a:schemeClr val="accent1"/>
+              </a:buClr>
+              <a:buSzPct val="75000"/>
+              <a:buFont typeface="Wingdings" pitchFamily="2" charset="2"/>
+              <a:buChar char="n"/>
+              <a:defRPr sz="2000" kern="1200">
+                <a:solidFill>
+                  <a:schemeClr val="tx1">
+                    <a:lumMod val="65000"/>
+                    <a:lumOff val="35000"/>
+                  </a:schemeClr>
+                </a:solidFill>
+                <a:latin typeface="+mn-lt"/>
+                <a:ea typeface="+mn-ea"/>
+                <a:cs typeface="+mn-cs"/>
+              </a:defRPr>
+            </a:lvl1pPr>
+            <a:lvl2pPr marL="457200" indent="-228600" algn="l" defTabSz="914400" rtl="0" eaLnBrk="1" latinLnBrk="0" hangingPunct="1">
+              <a:spcBef>
+                <a:spcPts val="600"/>
+              </a:spcBef>
+              <a:buClr>
+                <a:schemeClr val="accent1">
+                  <a:lumMod val="60000"/>
+                  <a:lumOff val="40000"/>
+                </a:schemeClr>
+              </a:buClr>
+              <a:buSzPct val="75000"/>
+              <a:buFont typeface="Wingdings" pitchFamily="2" charset="2"/>
+              <a:buChar char="n"/>
+              <a:defRPr sz="1800" kern="1200">
+                <a:solidFill>
+                  <a:schemeClr val="tx1">
+                    <a:lumMod val="65000"/>
+                    <a:lumOff val="35000"/>
+                  </a:schemeClr>
+                </a:solidFill>
+                <a:latin typeface="+mn-lt"/>
+                <a:ea typeface="+mn-ea"/>
+                <a:cs typeface="+mn-cs"/>
+              </a:defRPr>
+            </a:lvl2pPr>
+            <a:lvl3pPr marL="685800" indent="-228600" algn="l" defTabSz="914400" rtl="0" eaLnBrk="1" latinLnBrk="0" hangingPunct="1">
+              <a:spcBef>
+                <a:spcPts val="600"/>
+              </a:spcBef>
+              <a:buClr>
+                <a:schemeClr val="accent1"/>
+              </a:buClr>
+              <a:buSzPct val="75000"/>
+              <a:buFont typeface="Wingdings" pitchFamily="2" charset="2"/>
+              <a:buChar char="n"/>
+              <a:defRPr sz="1800" kern="1200">
+                <a:solidFill>
+                  <a:schemeClr val="tx1">
+                    <a:lumMod val="65000"/>
+                    <a:lumOff val="35000"/>
+                  </a:schemeClr>
+                </a:solidFill>
+                <a:latin typeface="+mn-lt"/>
+                <a:ea typeface="+mn-ea"/>
+                <a:cs typeface="+mn-cs"/>
+              </a:defRPr>
+            </a:lvl3pPr>
+            <a:lvl4pPr marL="914400" indent="-228600" algn="l" defTabSz="914400" rtl="0" eaLnBrk="1" latinLnBrk="0" hangingPunct="1">
+              <a:spcBef>
+                <a:spcPts val="600"/>
+              </a:spcBef>
+              <a:buClr>
+                <a:schemeClr val="accent1">
+                  <a:lumMod val="60000"/>
+                  <a:lumOff val="40000"/>
+                </a:schemeClr>
+              </a:buClr>
+              <a:buSzPct val="75000"/>
+              <a:buFont typeface="Wingdings" pitchFamily="2" charset="2"/>
+              <a:buChar char="n"/>
+              <a:defRPr sz="1800" kern="1200">
+                <a:solidFill>
+                  <a:schemeClr val="tx1">
+                    <a:lumMod val="65000"/>
+                    <a:lumOff val="35000"/>
+                  </a:schemeClr>
+                </a:solidFill>
+                <a:latin typeface="+mn-lt"/>
+                <a:ea typeface="+mn-ea"/>
+                <a:cs typeface="+mn-cs"/>
+              </a:defRPr>
+            </a:lvl4pPr>
+            <a:lvl5pPr marL="1143000" indent="-228600" algn="l" defTabSz="914400" rtl="0" eaLnBrk="1" latinLnBrk="0" hangingPunct="1">
+              <a:spcBef>
+                <a:spcPts val="600"/>
+              </a:spcBef>
+              <a:buClr>
+                <a:schemeClr val="accent1"/>
+              </a:buClr>
+              <a:buSzPct val="75000"/>
+              <a:buFont typeface="Wingdings" pitchFamily="2" charset="2"/>
+              <a:buChar char="n"/>
+              <a:defRPr sz="1800" kern="1200">
+                <a:solidFill>
+                  <a:schemeClr val="tx1">
+                    <a:lumMod val="65000"/>
+                    <a:lumOff val="35000"/>
+                  </a:schemeClr>
+                </a:solidFill>
+                <a:latin typeface="+mn-lt"/>
+                <a:ea typeface="+mn-ea"/>
+                <a:cs typeface="+mn-cs"/>
+              </a:defRPr>
+            </a:lvl5pPr>
+            <a:lvl6pPr marL="1377950" indent="-228600" algn="l" defTabSz="914400" rtl="0" eaLnBrk="1" latinLnBrk="0" hangingPunct="1">
+              <a:spcBef>
+                <a:spcPct val="20000"/>
+              </a:spcBef>
+              <a:buClr>
+                <a:schemeClr val="accent1">
+                  <a:lumMod val="60000"/>
+                  <a:lumOff val="40000"/>
+                </a:schemeClr>
+              </a:buClr>
+              <a:buSzPct val="75000"/>
+              <a:buFont typeface="Wingdings" pitchFamily="2" charset="2"/>
+              <a:buChar char=""/>
+              <a:defRPr lang="en-US" sz="1800" kern="1200" dirty="0" smtClean="0">
+                <a:solidFill>
+                  <a:schemeClr val="tx1">
+                    <a:lumMod val="65000"/>
+                    <a:lumOff val="35000"/>
+                  </a:schemeClr>
+                </a:solidFill>
+                <a:latin typeface="+mn-lt"/>
+                <a:ea typeface="+mn-ea"/>
+                <a:cs typeface="+mn-cs"/>
+              </a:defRPr>
+            </a:lvl6pPr>
+            <a:lvl7pPr marL="1603375" indent="-228600" algn="l" defTabSz="914400" rtl="0" eaLnBrk="1" latinLnBrk="0" hangingPunct="1">
+              <a:spcBef>
+                <a:spcPct val="20000"/>
+              </a:spcBef>
+              <a:buClr>
+                <a:schemeClr val="accent1"/>
+              </a:buClr>
+              <a:buSzPct val="75000"/>
+              <a:buFont typeface="Wingdings" pitchFamily="2" charset="2"/>
+              <a:buChar char=""/>
+              <a:defRPr lang="en-US" sz="1800" kern="1200" baseline="0" dirty="0" smtClean="0">
+                <a:solidFill>
+                  <a:schemeClr val="tx1">
+                    <a:lumMod val="65000"/>
+                    <a:lumOff val="35000"/>
+                  </a:schemeClr>
+                </a:solidFill>
+                <a:latin typeface="+mn-lt"/>
+                <a:ea typeface="+mn-ea"/>
+                <a:cs typeface="+mn-cs"/>
+              </a:defRPr>
+            </a:lvl7pPr>
+            <a:lvl8pPr marL="1830388" indent="-228600" algn="l" defTabSz="914400" rtl="0" eaLnBrk="1" latinLnBrk="0" hangingPunct="1">
+              <a:spcBef>
+                <a:spcPct val="20000"/>
+              </a:spcBef>
+              <a:buClr>
+                <a:schemeClr val="accent1">
+                  <a:lumMod val="60000"/>
+                  <a:lumOff val="40000"/>
+                </a:schemeClr>
+              </a:buClr>
+              <a:buSzPct val="75000"/>
+              <a:buFont typeface="Wingdings" pitchFamily="2" charset="2"/>
+              <a:buChar char=""/>
+              <a:defRPr lang="en-US" sz="1800" kern="1200" baseline="0" dirty="0" smtClean="0">
+                <a:solidFill>
+                  <a:schemeClr val="tx1">
+                    <a:lumMod val="65000"/>
+                    <a:lumOff val="35000"/>
+                  </a:schemeClr>
+                </a:solidFill>
+                <a:latin typeface="+mn-lt"/>
+                <a:ea typeface="+mn-ea"/>
+                <a:cs typeface="+mn-cs"/>
+              </a:defRPr>
+            </a:lvl8pPr>
+            <a:lvl9pPr marL="2057400" indent="-228600" algn="l" defTabSz="914400" rtl="0" eaLnBrk="1" latinLnBrk="0" hangingPunct="1">
+              <a:spcBef>
+                <a:spcPct val="20000"/>
+              </a:spcBef>
+              <a:buClr>
+                <a:schemeClr val="accent1"/>
+              </a:buClr>
+              <a:buSzPct val="75000"/>
+              <a:buFont typeface="Wingdings" pitchFamily="2" charset="2"/>
+              <a:buChar char=""/>
+              <a:defRPr lang="en-US" sz="1800" kern="1200" baseline="0" dirty="0">
+                <a:solidFill>
+                  <a:schemeClr val="tx1">
+                    <a:lumMod val="65000"/>
+                    <a:lumOff val="35000"/>
+                  </a:schemeClr>
+                </a:solidFill>
+                <a:latin typeface="+mn-lt"/>
+                <a:ea typeface="+mn-ea"/>
+                <a:cs typeface="+mn-cs"/>
+              </a:defRPr>
+            </a:lvl9pPr>
+          </a:lstStyle>
+          <a:p>
+            <a:pPr marL="0" indent="0">
+              <a:buNone/>
+            </a:pPr>
+            <a:endParaRPr lang="pt-PT" sz="2400" dirty="0">
+              <a:solidFill>
+                <a:schemeClr val="bg1">
+                  <a:lumMod val="65000"/>
+                </a:schemeClr>
+              </a:solidFill>
+              <a:latin typeface="+mj-lt"/>
+            </a:endParaRPr>
+          </a:p>
+        </p:txBody>
+      </p:sp>
+      <p:sp>
+        <p:nvSpPr>
+          <p:cNvPr id="9" name="Marcador de Posição de Conteúdo 2"/>
+          <p:cNvSpPr>
+            <a:spLocks noGrp="1"/>
+          </p:cNvSpPr>
+          <p:nvPr>
+            <p:ph idx="1"/>
+          </p:nvPr>
+        </p:nvSpPr>
+        <p:spPr>
+          <a:xfrm>
+            <a:off x="391595" y="1981200"/>
+            <a:ext cx="8419895" cy="4692732"/>
+          </a:xfrm>
+        </p:spPr>
+        <p:txBody>
+          <a:bodyPr>
+            <a:noAutofit/>
+          </a:bodyPr>
+          <a:lstStyle/>
+          <a:p>
+            <a:pPr>
+              <a:lnSpc>
+                <a:spcPct val="150000"/>
+              </a:lnSpc>
+              <a:spcBef>
+                <a:spcPts val="800"/>
+              </a:spcBef>
+            </a:pPr>
+            <a:r>
+              <a:rPr lang="pt-PT" sz="1600" dirty="0" smtClean="0">
+                <a:solidFill>
+                  <a:srgbClr val="00000A"/>
+                </a:solidFill>
+                <a:ea typeface="Cambria" charset="0"/>
+                <a:cs typeface="Cambria" charset="0"/>
+              </a:rPr>
+              <a:t>Dados</a:t>
+            </a:r>
+          </a:p>
+          <a:p>
+            <a:pPr>
+              <a:lnSpc>
+                <a:spcPct val="150000"/>
+              </a:lnSpc>
+              <a:spcBef>
+                <a:spcPts val="800"/>
+              </a:spcBef>
+            </a:pPr>
+            <a:endParaRPr lang="pt-PT" sz="1600" dirty="0" smtClean="0">
+              <a:solidFill>
+                <a:srgbClr val="00000A"/>
+              </a:solidFill>
+              <a:ea typeface="Cambria" charset="0"/>
+              <a:cs typeface="Cambria" charset="0"/>
+            </a:endParaRPr>
+          </a:p>
+          <a:p>
+            <a:pPr>
+              <a:lnSpc>
+                <a:spcPct val="150000"/>
+              </a:lnSpc>
+              <a:spcBef>
+                <a:spcPts val="800"/>
+              </a:spcBef>
+            </a:pPr>
+            <a:r>
+              <a:rPr lang="pt-PT" sz="1600" dirty="0" smtClean="0">
+                <a:solidFill>
+                  <a:srgbClr val="00000A"/>
+                </a:solidFill>
+                <a:ea typeface="Cambria" charset="0"/>
+                <a:cs typeface="Cambria" charset="0"/>
+              </a:rPr>
+              <a:t>Ambiente</a:t>
+            </a:r>
+          </a:p>
+          <a:p>
+            <a:pPr>
+              <a:lnSpc>
+                <a:spcPct val="150000"/>
+              </a:lnSpc>
+              <a:spcBef>
+                <a:spcPts val="800"/>
+              </a:spcBef>
+            </a:pPr>
+            <a:endParaRPr lang="pt-PT" sz="1600" dirty="0" smtClean="0">
+              <a:solidFill>
+                <a:srgbClr val="00000A"/>
+              </a:solidFill>
+              <a:ea typeface="Cambria" charset="0"/>
+              <a:cs typeface="Cambria" charset="0"/>
+            </a:endParaRPr>
+          </a:p>
+          <a:p>
+            <a:pPr>
+              <a:lnSpc>
+                <a:spcPct val="150000"/>
+              </a:lnSpc>
+              <a:spcBef>
+                <a:spcPts val="800"/>
+              </a:spcBef>
+            </a:pPr>
+            <a:r>
+              <a:rPr lang="pt-PT" sz="1600" dirty="0" smtClean="0">
+                <a:solidFill>
+                  <a:srgbClr val="00000A"/>
+                </a:solidFill>
+                <a:ea typeface="Cambria" charset="0"/>
+                <a:cs typeface="Cambria" charset="0"/>
+              </a:rPr>
+              <a:t>Utilizador</a:t>
+            </a:r>
+          </a:p>
+          <a:p>
+            <a:pPr>
+              <a:lnSpc>
+                <a:spcPct val="150000"/>
+              </a:lnSpc>
+              <a:spcBef>
+                <a:spcPts val="800"/>
+              </a:spcBef>
+            </a:pPr>
+            <a:endParaRPr lang="pt-PT" sz="1600" dirty="0">
+              <a:solidFill>
+                <a:srgbClr val="00000A"/>
+              </a:solidFill>
+              <a:ea typeface="Cambria" charset="0"/>
+              <a:cs typeface="Cambria" charset="0"/>
+            </a:endParaRPr>
+          </a:p>
+        </p:txBody>
+      </p:sp>
+    </p:spTree>
+    <p:extLst>
+      <p:ext uri="{BB962C8B-B14F-4D97-AF65-F5344CB8AC3E}">
+        <p14:creationId xmlns:p14="http://schemas.microsoft.com/office/powerpoint/2010/main" val="54083665"/>
       </p:ext>
     </p:extLst>
   </p:cSld>
@@ -14074,13 +14694,20 @@
                 </a:solidFill>
                 <a:latin typeface="+mj-lt"/>
               </a:rPr>
-              <a:t>Personas Participantes</a:t>
+              <a:t>Personas Participantes: </a:t>
+            </a:r>
+            <a:r>
+              <a:rPr lang="pt-PT" sz="2400" dirty="0" smtClean="0">
+                <a:solidFill>
+                  <a:schemeClr val="tx1"/>
+                </a:solidFill>
+                <a:latin typeface="+mj-lt"/>
+              </a:rPr>
+              <a:t>Sr. Antunes</a:t>
             </a:r>
             <a:endParaRPr lang="pt-PT" sz="2400" dirty="0">
               <a:solidFill>
-                <a:schemeClr val="bg1">
-                  <a:lumMod val="65000"/>
-                </a:schemeClr>
+                <a:schemeClr val="tx1"/>
               </a:solidFill>
               <a:latin typeface="+mj-lt"/>
             </a:endParaRPr>
@@ -14100,7 +14727,7 @@
         <p:spPr>
           <a:xfrm>
             <a:off x="391596" y="1981200"/>
-            <a:ext cx="8194264" cy="4324597"/>
+            <a:ext cx="8194264" cy="4680857"/>
           </a:xfrm>
         </p:spPr>
         <p:txBody>
@@ -14109,21 +14736,124 @@
           </a:bodyPr>
           <a:lstStyle/>
           <a:p>
-            <a:pPr>
+            <a:pPr marL="0" indent="0">
               <a:lnSpc>
                 <a:spcPct val="150000"/>
               </a:lnSpc>
               <a:spcBef>
                 <a:spcPts val="800"/>
               </a:spcBef>
+              <a:buNone/>
             </a:pPr>
-            <a:endParaRPr lang="pt-PT" sz="1400" dirty="0">
-              <a:solidFill>
-                <a:srgbClr val="00000A"/>
-              </a:solidFill>
-              <a:ea typeface="Cambria" charset="0"/>
-              <a:cs typeface="Cambria" charset="0"/>
-            </a:endParaRPr>
+            <a:r>
+              <a:rPr lang="pt-PT" sz="1400" dirty="0" smtClean="0"/>
+              <a:t>	A filha </a:t>
+            </a:r>
+            <a:r>
+              <a:rPr lang="pt-PT" sz="1400" dirty="0"/>
+              <a:t>do </a:t>
+            </a:r>
+            <a:r>
+              <a:rPr lang="pt-PT" sz="1400" dirty="0" smtClean="0"/>
+              <a:t>Sr. </a:t>
+            </a:r>
+            <a:r>
+              <a:rPr lang="pt-PT" sz="1400" dirty="0"/>
+              <a:t>Antunes pensou que seria interessante o pai aprender técnicas para jogar </a:t>
+            </a:r>
+            <a:r>
+              <a:rPr lang="pt-PT" sz="1400" dirty="0" smtClean="0"/>
+              <a:t>cartas, com a </a:t>
+            </a:r>
+            <a:r>
+              <a:rPr lang="pt-PT" sz="1400" dirty="0"/>
+              <a:t>esperança de que começasse a ganhar aos amigos e </a:t>
+            </a:r>
+            <a:r>
+              <a:rPr lang="pt-PT" sz="1400" dirty="0" smtClean="0"/>
+              <a:t>fica-se </a:t>
+            </a:r>
+            <a:r>
+              <a:rPr lang="pt-PT" sz="1400" dirty="0"/>
+              <a:t>mais satisfeito, </a:t>
+            </a:r>
+            <a:r>
+              <a:rPr lang="pt-PT" sz="1400" dirty="0" smtClean="0"/>
+              <a:t> pensou em aulas pela internet, pois </a:t>
+            </a:r>
+            <a:r>
+              <a:rPr lang="pt-PT" sz="1400" dirty="0"/>
+              <a:t>sabia que o pai já devia ter-se ambientado a navegar pelo </a:t>
+            </a:r>
+            <a:r>
+              <a:rPr lang="pt-PT" sz="1400" dirty="0" smtClean="0"/>
+              <a:t>computador, depois do exame de código que fez. </a:t>
+            </a:r>
+            <a:r>
+              <a:rPr lang="pt-PT" sz="1400" dirty="0"/>
+              <a:t>Inscreveu-o numa plataforma de aprendizagem online, no curso de jogos de cartas. Inicialmente, o </a:t>
+            </a:r>
+            <a:r>
+              <a:rPr lang="pt-PT" sz="1400" dirty="0" smtClean="0"/>
+              <a:t>Sr. </a:t>
+            </a:r>
+            <a:r>
+              <a:rPr lang="pt-PT" sz="1400" dirty="0"/>
+              <a:t>Antunes sentiu-se confuso, assustado e sem vontade de usar a plataforma, por </a:t>
+            </a:r>
+            <a:r>
+              <a:rPr lang="pt-PT" sz="1400" dirty="0" smtClean="0"/>
+              <a:t>esta pedir </a:t>
+            </a:r>
+            <a:r>
+              <a:rPr lang="pt-PT" sz="1400" dirty="0"/>
+              <a:t>sempre </a:t>
+            </a:r>
+            <a:r>
+              <a:rPr lang="pt-PT" sz="1400" dirty="0" smtClean="0"/>
+              <a:t>para se identificar através do </a:t>
+            </a:r>
+            <a:r>
+              <a:rPr lang="pt-PT" sz="1400" dirty="0"/>
+              <a:t>login. Decidiu falar sobre essa dificuldade com a filha, que lhe ligou o login automático. Depois disto, o </a:t>
+            </a:r>
+            <a:r>
+              <a:rPr lang="pt-PT" sz="1400" dirty="0" smtClean="0"/>
+              <a:t>Sr. </a:t>
+            </a:r>
+            <a:r>
+              <a:rPr lang="pt-PT" sz="1400" dirty="0"/>
+              <a:t>Antunes começou a ficar mais interessado pela plataforma, mas continuava a ter dificuldades a ler as letras pequenas do resumo que o professor deixava na </a:t>
+            </a:r>
+            <a:r>
+              <a:rPr lang="pt-PT" sz="1400" dirty="0" smtClean="0"/>
+              <a:t>página, pois queria consultá-lo para rever as técnicas que foram ensinadas na aula. </a:t>
+            </a:r>
+            <a:r>
+              <a:rPr lang="pt-PT" sz="1400" dirty="0"/>
+              <a:t>Novamente, a sua filha ajudou-o, apontando uma função que permite regular o tamanho das </a:t>
+            </a:r>
+            <a:r>
+              <a:rPr lang="pt-PT" sz="1400" dirty="0" smtClean="0"/>
+              <a:t>letras, junto da área dos resumos. </a:t>
+            </a:r>
+            <a:r>
+              <a:rPr lang="pt-PT" sz="1400" dirty="0"/>
+              <a:t>Desta forma, o </a:t>
+            </a:r>
+            <a:r>
+              <a:rPr lang="pt-PT" sz="1400" dirty="0" smtClean="0"/>
+              <a:t>Sr. </a:t>
+            </a:r>
+            <a:r>
+              <a:rPr lang="pt-PT" sz="1400" dirty="0"/>
+              <a:t>Antunes passou a conseguir ver os resumos disponíveis na página e utilizar a plataforma </a:t>
+            </a:r>
+            <a:r>
+              <a:rPr lang="pt-PT" sz="1400" dirty="0" smtClean="0"/>
+              <a:t>normalmente. Ainda assim o Sr. Antunes liga muitas vezes à sua filha para tirar dúvidas em relação à manipulação da interface da plataforma, com “medo de errar” ou “estragar o computador”.</a:t>
+            </a:r>
+            <a:endParaRPr lang="pt-PT" sz="1400" dirty="0"/>
           </a:p>
         </p:txBody>
       </p:sp>
@@ -14441,13 +15171,58 @@
                 </a:solidFill>
                 <a:latin typeface="+mj-lt"/>
               </a:rPr>
-              <a:t>Personas Participantes</a:t>
+              <a:t>Personas Participantes: </a:t>
+            </a:r>
+            <a:r>
+              <a:rPr lang="pt-PT" sz="2400" dirty="0" smtClean="0">
+                <a:solidFill>
+                  <a:schemeClr val="tx1"/>
+                </a:solidFill>
+                <a:latin typeface="+mj-lt"/>
+              </a:rPr>
+              <a:t>D</a:t>
+            </a:r>
+            <a:r>
+              <a:rPr lang="pt-PT" sz="2400" dirty="0" err="1" smtClean="0">
+                <a:solidFill>
+                  <a:schemeClr val="tx1"/>
+                </a:solidFill>
+                <a:latin typeface="+mj-lt"/>
+              </a:rPr>
+              <a:t>ª</a:t>
+            </a:r>
+            <a:r>
+              <a:rPr lang="pt-PT" sz="2400" dirty="0" smtClean="0">
+                <a:solidFill>
+                  <a:schemeClr val="tx1"/>
+                </a:solidFill>
+                <a:latin typeface="+mj-lt"/>
+              </a:rPr>
+              <a:t> Mariana </a:t>
+            </a:r>
+            <a:r>
+              <a:rPr lang="pt-PT" sz="2400" dirty="0" smtClean="0">
+                <a:solidFill>
+                  <a:schemeClr val="bg1">
+                    <a:lumMod val="65000"/>
+                  </a:schemeClr>
+                </a:solidFill>
+                <a:latin typeface="+mj-lt"/>
+              </a:rPr>
+              <a:t>e </a:t>
+            </a:r>
+            <a:r>
+              <a:rPr lang="pt-PT" sz="2400" dirty="0" smtClean="0">
+                <a:solidFill>
+                  <a:schemeClr val="tx1"/>
+                </a:solidFill>
+                <a:latin typeface="+mj-lt"/>
+              </a:rPr>
+              <a:t>Prof. Teresa</a:t>
             </a:r>
             <a:endParaRPr lang="pt-PT" sz="2400" dirty="0">
               <a:solidFill>
-                <a:schemeClr val="bg1">
-                  <a:lumMod val="65000"/>
-                </a:schemeClr>
+                <a:schemeClr val="tx1"/>
               </a:solidFill>
               <a:latin typeface="+mj-lt"/>
             </a:endParaRPr>
@@ -14486,8 +15261,12 @@
               <a:buNone/>
             </a:pPr>
             <a:r>
+              <a:rPr lang="pt-PT" sz="1400" dirty="0" smtClean="0"/>
+              <a:t>	A </a:t>
+            </a:r>
+            <a:r>
               <a:rPr lang="pt-PT" sz="1400" dirty="0"/>
-              <a:t>A D</a:t>
+              <a:t>D</a:t>
             </a:r>
             <a:r>
               <a:rPr lang="pt-PT" sz="1400" dirty="0" err="1"/>
@@ -14551,11 +15330,7 @@
             </a:r>
             <a:r>
               <a:rPr lang="pt-PT" sz="1400" dirty="0" smtClean="0"/>
-              <a:t>semanais, </a:t>
-            </a:r>
-            <a:r>
-              <a:rPr lang="pt-PT" sz="1400" dirty="0" smtClean="0"/>
-              <a:t>o que a D</a:t>
+              <a:t>semanais, o que a D</a:t>
             </a:r>
             <a:r>
               <a:rPr lang="pt-PT" sz="1400" dirty="0" err="1" smtClean="0"/>
@@ -14586,7 +15361,7 @@
             </a:pPr>
             <a:r>
               <a:rPr lang="pt-PT" sz="1400" dirty="0" smtClean="0"/>
-              <a:t>A </a:t>
+              <a:t>	A </a:t>
             </a:r>
             <a:r>
               <a:rPr lang="pt-PT" sz="1400" dirty="0"/>
@@ -14626,11 +15401,7 @@
             </a:r>
             <a:r>
               <a:rPr lang="pt-PT" sz="1400" dirty="0" smtClean="0"/>
-              <a:t>j</a:t>
-            </a:r>
-            <a:r>
-              <a:rPr lang="pt-PT" sz="1400" dirty="0" smtClean="0"/>
-              <a:t>á foi </a:t>
+              <a:t>já foi </a:t>
             </a:r>
             <a:r>
               <a:rPr lang="pt-PT" sz="1400" dirty="0" err="1" smtClean="0"/>

</xml_diff>

<commit_message>
bug fixes postos no ppt5
</commit_message>
<xml_diff>
--- a/Aula 05/G10 - Apresentacao - Lab05.pptx
+++ b/Aula 05/G10 - Apresentacao - Lab05.pptx
@@ -121,7 +121,7 @@
   </p:defaultTextStyle>
   <p:extLst>
     <p:ext uri="{EFAFB233-063F-42B5-8137-9DF3F51BA10A}">
-      <p15:sldGuideLst xmlns:p15="http://schemas.microsoft.com/office/powerpoint/2012/main">
+      <p15:sldGuideLst xmlns:p15="http://schemas.microsoft.com/office/powerpoint/2012/main" xmlns="">
         <p15:guide id="1" orient="horz" pos="2160">
           <p15:clr>
             <a:srgbClr val="A4A3A4"/>
@@ -220,7 +220,7 @@
           <a:p>
             <a:fld id="{A0410F9C-3A27-C84F-B27D-9342140F08DB}" type="datetimeFigureOut">
               <a:rPr lang="pt-PT" smtClean="0"/>
-              <a:t>29/10/15</a:t>
+              <a:t>29-10-2015</a:t>
             </a:fld>
             <a:endParaRPr lang="pt-PT"/>
           </a:p>
@@ -379,7 +379,7 @@
           <a:p>
             <a:fld id="{9886E254-ACB4-B240-BB93-3D6DFACA42BA}" type="slidenum">
               <a:rPr lang="pt-PT" smtClean="0"/>
-              <a:t>‹nº›</a:t>
+              <a:t>‹#›</a:t>
             </a:fld>
             <a:endParaRPr lang="pt-PT"/>
           </a:p>
@@ -1025,7 +1025,7 @@
           <a:p>
             <a:fld id="{D728701E-CAF4-4159-9B3E-41C86DFFA30D}" type="datetimeFigureOut">
               <a:rPr lang="en-US" smtClean="0"/>
-              <a:t>10/29/15</a:t>
+              <a:t>29-Oct-15</a:t>
             </a:fld>
             <a:endParaRPr lang="en-US"/>
           </a:p>
@@ -1479,7 +1479,7 @@
           <a:p>
             <a:fld id="{D728701E-CAF4-4159-9B3E-41C86DFFA30D}" type="datetimeFigureOut">
               <a:rPr lang="en-US" smtClean="0"/>
-              <a:t>10/29/15</a:t>
+              <a:t>29-Oct-15</a:t>
             </a:fld>
             <a:endParaRPr lang="en-US"/>
           </a:p>
@@ -1521,7 +1521,7 @@
           <a:p>
             <a:fld id="{162F1D00-BD13-4404-86B0-79703945A0A7}" type="slidenum">
               <a:rPr lang="en-US" smtClean="0"/>
-              <a:t>‹nº›</a:t>
+              <a:t>‹#›</a:t>
             </a:fld>
             <a:endParaRPr lang="en-US"/>
           </a:p>
@@ -2022,7 +2022,7 @@
           <a:p>
             <a:fld id="{D728701E-CAF4-4159-9B3E-41C86DFFA30D}" type="datetimeFigureOut">
               <a:rPr lang="en-US" smtClean="0"/>
-              <a:t>10/29/15</a:t>
+              <a:t>29-Oct-15</a:t>
             </a:fld>
             <a:endParaRPr lang="en-US"/>
           </a:p>
@@ -2064,7 +2064,7 @@
           <a:p>
             <a:fld id="{162F1D00-BD13-4404-86B0-79703945A0A7}" type="slidenum">
               <a:rPr lang="en-US" smtClean="0"/>
-              <a:t>‹nº›</a:t>
+              <a:t>‹#›</a:t>
             </a:fld>
             <a:endParaRPr lang="en-US"/>
           </a:p>
@@ -2158,7 +2158,7 @@
           <a:p>
             <a:fld id="{D728701E-CAF4-4159-9B3E-41C86DFFA30D}" type="datetimeFigureOut">
               <a:rPr lang="en-US" smtClean="0"/>
-              <a:t>10/29/15</a:t>
+              <a:t>29-Oct-15</a:t>
             </a:fld>
             <a:endParaRPr lang="en-US"/>
           </a:p>
@@ -2200,7 +2200,7 @@
           <a:p>
             <a:fld id="{162F1D00-BD13-4404-86B0-79703945A0A7}" type="slidenum">
               <a:rPr lang="en-US" smtClean="0"/>
-              <a:t>‹nº›</a:t>
+              <a:t>‹#›</a:t>
             </a:fld>
             <a:endParaRPr lang="en-US"/>
           </a:p>
@@ -2496,7 +2496,7 @@
           <a:p>
             <a:fld id="{D728701E-CAF4-4159-9B3E-41C86DFFA30D}" type="datetimeFigureOut">
               <a:rPr lang="en-US" smtClean="0"/>
-              <a:t>10/29/15</a:t>
+              <a:t>29-Oct-15</a:t>
             </a:fld>
             <a:endParaRPr lang="en-US"/>
           </a:p>
@@ -2822,7 +2822,7 @@
           <a:p>
             <a:fld id="{D728701E-CAF4-4159-9B3E-41C86DFFA30D}" type="datetimeFigureOut">
               <a:rPr lang="en-US" smtClean="0"/>
-              <a:t>10/29/15</a:t>
+              <a:t>29-Oct-15</a:t>
             </a:fld>
             <a:endParaRPr lang="en-US"/>
           </a:p>
@@ -2869,7 +2869,7 @@
           <a:p>
             <a:fld id="{162F1D00-BD13-4404-86B0-79703945A0A7}" type="slidenum">
               <a:rPr lang="en-US" smtClean="0"/>
-              <a:t>‹nº›</a:t>
+              <a:t>‹#›</a:t>
             </a:fld>
             <a:endParaRPr lang="en-US"/>
           </a:p>
@@ -3120,7 +3120,7 @@
           <a:p>
             <a:fld id="{D728701E-CAF4-4159-9B3E-41C86DFFA30D}" type="datetimeFigureOut">
               <a:rPr lang="en-US" smtClean="0"/>
-              <a:t>10/29/15</a:t>
+              <a:t>29-Oct-15</a:t>
             </a:fld>
             <a:endParaRPr lang="en-US"/>
           </a:p>
@@ -3162,7 +3162,7 @@
           <a:p>
             <a:fld id="{162F1D00-BD13-4404-86B0-79703945A0A7}" type="slidenum">
               <a:rPr lang="en-US" smtClean="0"/>
-              <a:t>‹nº›</a:t>
+              <a:t>‹#›</a:t>
             </a:fld>
             <a:endParaRPr lang="en-US"/>
           </a:p>
@@ -3507,7 +3507,7 @@
           <a:p>
             <a:fld id="{D728701E-CAF4-4159-9B3E-41C86DFFA30D}" type="datetimeFigureOut">
               <a:rPr lang="en-US" smtClean="0"/>
-              <a:t>10/29/15</a:t>
+              <a:t>29-Oct-15</a:t>
             </a:fld>
             <a:endParaRPr lang="en-US"/>
           </a:p>
@@ -3562,7 +3562,7 @@
           <a:p>
             <a:fld id="{162F1D00-BD13-4404-86B0-79703945A0A7}" type="slidenum">
               <a:rPr lang="en-US" smtClean="0"/>
-              <a:t>‹nº›</a:t>
+              <a:t>‹#›</a:t>
             </a:fld>
             <a:endParaRPr lang="en-US"/>
           </a:p>
@@ -3927,7 +3927,7 @@
           <a:p>
             <a:fld id="{D728701E-CAF4-4159-9B3E-41C86DFFA30D}" type="datetimeFigureOut">
               <a:rPr lang="en-US" smtClean="0"/>
-              <a:t>10/29/15</a:t>
+              <a:t>29-Oct-15</a:t>
             </a:fld>
             <a:endParaRPr lang="en-US"/>
           </a:p>
@@ -3982,7 +3982,7 @@
           <a:p>
             <a:fld id="{162F1D00-BD13-4404-86B0-79703945A0A7}" type="slidenum">
               <a:rPr lang="en-US" smtClean="0"/>
-              <a:t>‹nº›</a:t>
+              <a:t>‹#›</a:t>
             </a:fld>
             <a:endParaRPr lang="en-US"/>
           </a:p>
@@ -4475,7 +4475,7 @@
           <a:p>
             <a:fld id="{D728701E-CAF4-4159-9B3E-41C86DFFA30D}" type="datetimeFigureOut">
               <a:rPr lang="en-US" smtClean="0"/>
-              <a:t>10/29/15</a:t>
+              <a:t>29-Oct-15</a:t>
             </a:fld>
             <a:endParaRPr lang="en-US"/>
           </a:p>
@@ -4522,7 +4522,7 @@
           <a:p>
             <a:fld id="{162F1D00-BD13-4404-86B0-79703945A0A7}" type="slidenum">
               <a:rPr lang="en-US" smtClean="0"/>
-              <a:t>‹nº›</a:t>
+              <a:t>‹#›</a:t>
             </a:fld>
             <a:endParaRPr lang="en-US"/>
           </a:p>
@@ -4833,7 +4833,7 @@
           <a:p>
             <a:fld id="{D728701E-CAF4-4159-9B3E-41C86DFFA30D}" type="datetimeFigureOut">
               <a:rPr lang="en-US" smtClean="0"/>
-              <a:t>10/29/15</a:t>
+              <a:t>29-Oct-15</a:t>
             </a:fld>
             <a:endParaRPr lang="en-US"/>
           </a:p>
@@ -4875,7 +4875,7 @@
           <a:p>
             <a:fld id="{162F1D00-BD13-4404-86B0-79703945A0A7}" type="slidenum">
               <a:rPr lang="en-US" smtClean="0"/>
-              <a:t>‹nº›</a:t>
+              <a:t>‹#›</a:t>
             </a:fld>
             <a:endParaRPr lang="en-US"/>
           </a:p>
@@ -5048,7 +5048,7 @@
           <a:p>
             <a:fld id="{D728701E-CAF4-4159-9B3E-41C86DFFA30D}" type="datetimeFigureOut">
               <a:rPr lang="en-US" smtClean="0"/>
-              <a:t>10/29/15</a:t>
+              <a:t>29-Oct-15</a:t>
             </a:fld>
             <a:endParaRPr lang="en-US"/>
           </a:p>
@@ -5090,7 +5090,7 @@
           <a:p>
             <a:fld id="{162F1D00-BD13-4404-86B0-79703945A0A7}" type="slidenum">
               <a:rPr lang="en-US" smtClean="0"/>
-              <a:t>‹nº›</a:t>
+              <a:t>‹#›</a:t>
             </a:fld>
             <a:endParaRPr lang="en-US"/>
           </a:p>
@@ -5355,7 +5355,7 @@
           <a:p>
             <a:fld id="{D728701E-CAF4-4159-9B3E-41C86DFFA30D}" type="datetimeFigureOut">
               <a:rPr lang="en-US" smtClean="0"/>
-              <a:t>10/29/15</a:t>
+              <a:t>29-Oct-15</a:t>
             </a:fld>
             <a:endParaRPr lang="en-US"/>
           </a:p>
@@ -5397,7 +5397,7 @@
           <a:p>
             <a:fld id="{162F1D00-BD13-4404-86B0-79703945A0A7}" type="slidenum">
               <a:rPr lang="en-US" smtClean="0"/>
-              <a:t>‹nº›</a:t>
+              <a:t>‹#›</a:t>
             </a:fld>
             <a:endParaRPr lang="en-US"/>
           </a:p>
@@ -5611,7 +5611,7 @@
           <a:p>
             <a:fld id="{D728701E-CAF4-4159-9B3E-41C86DFFA30D}" type="datetimeFigureOut">
               <a:rPr lang="en-US" smtClean="0"/>
-              <a:t>10/29/15</a:t>
+              <a:t>29-Oct-15</a:t>
             </a:fld>
             <a:endParaRPr lang="en-US"/>
           </a:p>
@@ -5653,7 +5653,7 @@
           <a:p>
             <a:fld id="{162F1D00-BD13-4404-86B0-79703945A0A7}" type="slidenum">
               <a:rPr lang="en-US" smtClean="0"/>
-              <a:t>‹nº›</a:t>
+              <a:t>‹#›</a:t>
             </a:fld>
             <a:endParaRPr lang="en-US"/>
           </a:p>
@@ -6000,7 +6000,7 @@
           <a:p>
             <a:fld id="{D728701E-CAF4-4159-9B3E-41C86DFFA30D}" type="datetimeFigureOut">
               <a:rPr lang="en-US" smtClean="0"/>
-              <a:t>10/29/15</a:t>
+              <a:t>29-Oct-15</a:t>
             </a:fld>
             <a:endParaRPr lang="en-US"/>
           </a:p>
@@ -6589,7 +6589,7 @@
           <a:p>
             <a:fld id="{D728701E-CAF4-4159-9B3E-41C86DFFA30D}" type="datetimeFigureOut">
               <a:rPr lang="en-US" smtClean="0"/>
-              <a:t>10/29/15</a:t>
+              <a:t>29-Oct-15</a:t>
             </a:fld>
             <a:endParaRPr lang="en-US"/>
           </a:p>
@@ -6649,7 +6649,7 @@
           <a:p>
             <a:fld id="{162F1D00-BD13-4404-86B0-79703945A0A7}" type="slidenum">
               <a:rPr lang="en-US" smtClean="0"/>
-              <a:t>‹nº›</a:t>
+              <a:t>‹#›</a:t>
             </a:fld>
             <a:endParaRPr lang="en-US"/>
           </a:p>
@@ -7104,7 +7104,7 @@
           <a:p>
             <a:fld id="{D728701E-CAF4-4159-9B3E-41C86DFFA30D}" type="datetimeFigureOut">
               <a:rPr lang="en-US" smtClean="0"/>
-              <a:t>10/29/15</a:t>
+              <a:t>29-Oct-15</a:t>
             </a:fld>
             <a:endParaRPr lang="en-US"/>
           </a:p>
@@ -7146,7 +7146,7 @@
           <a:p>
             <a:fld id="{162F1D00-BD13-4404-86B0-79703945A0A7}" type="slidenum">
               <a:rPr lang="en-US" smtClean="0"/>
-              <a:t>‹nº›</a:t>
+              <a:t>‹#›</a:t>
             </a:fld>
             <a:endParaRPr lang="en-US"/>
           </a:p>
@@ -7477,7 +7477,7 @@
           <a:p>
             <a:fld id="{D728701E-CAF4-4159-9B3E-41C86DFFA30D}" type="datetimeFigureOut">
               <a:rPr lang="en-US" smtClean="0"/>
-              <a:t>10/29/15</a:t>
+              <a:t>29-Oct-15</a:t>
             </a:fld>
             <a:endParaRPr lang="en-US"/>
           </a:p>
@@ -7519,7 +7519,7 @@
           <a:p>
             <a:fld id="{162F1D00-BD13-4404-86B0-79703945A0A7}" type="slidenum">
               <a:rPr lang="en-US" smtClean="0"/>
-              <a:t>‹nº›</a:t>
+              <a:t>‹#›</a:t>
             </a:fld>
             <a:endParaRPr lang="en-US"/>
           </a:p>
@@ -7876,7 +7876,7 @@
           <a:p>
             <a:fld id="{D728701E-CAF4-4159-9B3E-41C86DFFA30D}" type="datetimeFigureOut">
               <a:rPr lang="en-US" smtClean="0"/>
-              <a:t>10/29/15</a:t>
+              <a:t>29-Oct-15</a:t>
             </a:fld>
             <a:endParaRPr lang="en-US"/>
           </a:p>
@@ -8056,7 +8056,7 @@
           <a:p>
             <a:fld id="{162F1D00-BD13-4404-86B0-79703945A0A7}" type="slidenum">
               <a:rPr lang="en-US" smtClean="0"/>
-              <a:t>‹nº›</a:t>
+              <a:t>‹#›</a:t>
             </a:fld>
             <a:endParaRPr lang="en-US"/>
           </a:p>
@@ -8296,7 +8296,7 @@
           <a:p>
             <a:fld id="{D728701E-CAF4-4159-9B3E-41C86DFFA30D}" type="datetimeFigureOut">
               <a:rPr lang="en-US" smtClean="0"/>
-              <a:t>10/29/15</a:t>
+              <a:t>29-Oct-15</a:t>
             </a:fld>
             <a:endParaRPr lang="en-US"/>
           </a:p>
@@ -8338,7 +8338,7 @@
           <a:p>
             <a:fld id="{162F1D00-BD13-4404-86B0-79703945A0A7}" type="slidenum">
               <a:rPr lang="en-US" smtClean="0"/>
-              <a:t>‹nº›</a:t>
+              <a:t>‹#›</a:t>
             </a:fld>
             <a:endParaRPr lang="en-US"/>
           </a:p>
@@ -8679,7 +8679,7 @@
           <a:p>
             <a:fld id="{D728701E-CAF4-4159-9B3E-41C86DFFA30D}" type="datetimeFigureOut">
               <a:rPr lang="en-US" smtClean="0"/>
-              <a:t>10/29/15</a:t>
+              <a:t>29-Oct-15</a:t>
             </a:fld>
             <a:endParaRPr lang="en-US"/>
           </a:p>
@@ -8756,7 +8756,7 @@
           <a:p>
             <a:fld id="{162F1D00-BD13-4404-86B0-79703945A0A7}" type="slidenum">
               <a:rPr lang="en-US" smtClean="0"/>
-              <a:t>‹nº›</a:t>
+              <a:t>‹#›</a:t>
             </a:fld>
             <a:endParaRPr lang="en-US"/>
           </a:p>
@@ -9696,7 +9696,7 @@
         </p:spPr>
         <p:txBody>
           <a:bodyPr>
-            <a:noAutofit/>
+            <a:normAutofit lnSpcReduction="10000"/>
           </a:bodyPr>
           <a:lstStyle/>
           <a:p>
@@ -9714,81 +9714,21 @@
               <a:t>	</a:t>
             </a:r>
             <a:r>
-              <a:rPr lang="pt-PT" sz="1300" dirty="0" smtClean="0"/>
-              <a:t>O Sr. João faz uma </a:t>
-            </a:r>
-            <a:r>
-              <a:rPr lang="pt-PT" sz="1300" dirty="0"/>
-              <a:t>pesquisa e </a:t>
-            </a:r>
-            <a:r>
-              <a:rPr lang="pt-PT" sz="1300" dirty="0" smtClean="0"/>
-              <a:t>rapidamente encontra </a:t>
-            </a:r>
-            <a:r>
-              <a:rPr lang="pt-PT" sz="1300" dirty="0"/>
-              <a:t>uma plataforma de aprendizagem, que </a:t>
-            </a:r>
-            <a:r>
-              <a:rPr lang="pt-PT" sz="1300" dirty="0" smtClean="0"/>
-              <a:t>explora, </a:t>
-            </a:r>
-            <a:r>
-              <a:rPr lang="pt-PT" sz="1300" dirty="0"/>
-              <a:t>e verifica que oferece um curso de alemão. Embora tenha alguma experiência a fazer compras online, utiliza a janela de chat do ecrã inicial para averiguar a legitimidade da plataforma, </a:t>
-            </a:r>
-            <a:r>
-              <a:rPr lang="pt-PT" sz="1300" dirty="0" smtClean="0"/>
-              <a:t>quanto </a:t>
-            </a:r>
-            <a:r>
-              <a:rPr lang="pt-PT" sz="1300" dirty="0"/>
-              <a:t>à informação de pagamento </a:t>
-            </a:r>
-            <a:r>
-              <a:rPr lang="pt-PT" sz="1300" dirty="0" smtClean="0"/>
-              <a:t>que deve </a:t>
-            </a:r>
-            <a:r>
-              <a:rPr lang="pt-PT" sz="1300" dirty="0"/>
-              <a:t>inserir. Depois de satisfeito, </a:t>
-            </a:r>
-            <a:r>
-              <a:rPr lang="pt-PT" sz="1300" dirty="0" smtClean="0"/>
-              <a:t>vai ainda explorar outro </a:t>
-            </a:r>
-            <a:r>
-              <a:rPr lang="pt-PT" sz="1300" dirty="0"/>
-              <a:t>problema: visto ter pouca disponibilidade para um curso intensivo, não lhe interessa aprender apenas algumas palavras numa sessão e depois não poder revê-las caso só volte na semana seguinte. </a:t>
-            </a:r>
-            <a:r>
-              <a:rPr lang="pt-PT" sz="1300" dirty="0" smtClean="0"/>
-              <a:t>Desta forma consulta a página principal do curso e verifica que o professor tem uma área onde coloca resumos. Satisfeito com o que vê verifica ainda que a página apresenta um vídeo introdutório com a explicação de como irá decorrer o curso e o material que o professor irá disponibilizar. Inteiramente convencido, </a:t>
-            </a:r>
-            <a:r>
-              <a:rPr lang="pt-PT" sz="1300" dirty="0" err="1" smtClean="0"/>
-              <a:t>efectua</a:t>
-            </a:r>
-            <a:r>
-              <a:rPr lang="pt-PT" sz="1300" dirty="0" smtClean="0"/>
-              <a:t> o pagamento do curso. A plataforma, antes do pagamento pede para o Sr. João que se registe, e tal como está habituado, procede ao preenchimento do formulário de inscrição. </a:t>
-            </a:r>
-            <a:r>
-              <a:rPr lang="pt-PT" sz="1300" dirty="0"/>
-              <a:t>D</a:t>
-            </a:r>
-            <a:r>
-              <a:rPr lang="pt-PT" sz="1300" dirty="0" smtClean="0"/>
-              <a:t>epois de preenchido o registo aparece a plataforma de pagamento, escolhe a opção de cartão de crédito, insere os dados e </a:t>
-            </a:r>
-            <a:r>
-              <a:rPr lang="pt-PT" sz="1300" dirty="0" err="1" smtClean="0"/>
-              <a:t>efectua</a:t>
-            </a:r>
-            <a:r>
-              <a:rPr lang="pt-PT" sz="1300" dirty="0" smtClean="0"/>
-              <a:t> o pagamento. Depois deste passos o Sr. João volta para a página do curso em que se inscreveu e vê que todos os conteúdos do curso estão já disponíveis. É então que inicia o seu curso, começando por visualizar o vídeo da lição nº1, presente na lista de vídeos das aulas.</a:t>
-            </a:r>
+              <a:rPr lang="pt-PT" sz="1400" dirty="0"/>
+              <a:t>O Sr. João faz uma pesquisa e rapidamente encontra uma plataforma de aprendizagem, que explora, e verifica que oferece um curso de alemão. Embora tenha alguma experiência a fazer compras online, utiliza a janela de chat do ecrã inicial para averiguar a legitimidade da plataforma, quanto à informação de pagamento que deve inserir. Depois de satisfeito, vai ainda explorar outro problema: visto ter pouca disponibilidade para um curso intensivo, não lhe interessa aprender apenas algumas palavras numa sessão e depois não poder revê-las caso só volte na semana seguinte. Desta forma consulta a página principal do curso e verifica que o professor tem uma área onde coloca resumos. Satisfeito com o que vê verifica ainda que a página apresenta um vídeo introdutório com a explicação de como irá decorrer o curso e o material que o professor irá disponibilizar. Inteiramente convencido, efectua o pagamento do curso. A plataforma, antes do pagamento, pede para o Sr. João que se registe, e tal como está habituado, procede ao preenchimento do formulário de inscrição. Depois de preenchido o registo aparece a plataforma de pagamento, escolhe a opção de cartão de crédito, insere os dados e efectua o pagamento. Depois deste passos o Sr. João volta para a página do curso em que se inscreveu e vê que todos os conteúdos do curso estão já disponíveis. É então que inicia o seu curso, começando por visualizar o vídeo da lição nº1, presente na lista de vídeos das aulas.</a:t>
+            </a:r>
+            <a:endParaRPr lang="en-US" sz="1400" dirty="0"/>
+          </a:p>
+          <a:p>
+            <a:pPr marL="0" indent="0">
+              <a:lnSpc>
+                <a:spcPct val="150000"/>
+              </a:lnSpc>
+              <a:spcBef>
+                <a:spcPts val="800"/>
+              </a:spcBef>
+              <a:buNone/>
+            </a:pPr>
             <a:endParaRPr lang="pt-PT" sz="1300" dirty="0"/>
           </a:p>
           <a:p>
@@ -14747,111 +14687,11 @@
             </a:pPr>
             <a:r>
               <a:rPr lang="pt-PT" sz="1400" dirty="0" smtClean="0"/>
-              <a:t>	A filha </a:t>
+              <a:t>	</a:t>
             </a:r>
             <a:r>
               <a:rPr lang="pt-PT" sz="1400" dirty="0"/>
-              <a:t>do </a:t>
-            </a:r>
-            <a:r>
-              <a:rPr lang="pt-PT" sz="1400" dirty="0" smtClean="0"/>
-              <a:t>Sr. </a:t>
-            </a:r>
-            <a:r>
-              <a:rPr lang="pt-PT" sz="1400" dirty="0"/>
-              <a:t>Antunes pensou que seria interessante o pai aprender técnicas para jogar </a:t>
-            </a:r>
-            <a:r>
-              <a:rPr lang="pt-PT" sz="1400" dirty="0" smtClean="0"/>
-              <a:t>cartas, com a </a:t>
-            </a:r>
-            <a:r>
-              <a:rPr lang="pt-PT" sz="1400" dirty="0"/>
-              <a:t>esperança de que começasse a ganhar aos amigos e </a:t>
-            </a:r>
-            <a:r>
-              <a:rPr lang="pt-PT" sz="1400" dirty="0" smtClean="0"/>
-              <a:t>fica-se </a:t>
-            </a:r>
-            <a:r>
-              <a:rPr lang="pt-PT" sz="1400" dirty="0"/>
-              <a:t>mais satisfeito, </a:t>
-            </a:r>
-            <a:r>
-              <a:rPr lang="pt-PT" sz="1400" dirty="0" smtClean="0"/>
-              <a:t> pensou em aulas pela internet, pois </a:t>
-            </a:r>
-            <a:r>
-              <a:rPr lang="pt-PT" sz="1400" dirty="0"/>
-              <a:t>sabia que o pai já devia ter-se ambientado a navegar pelo </a:t>
-            </a:r>
-            <a:r>
-              <a:rPr lang="pt-PT" sz="1400" dirty="0" smtClean="0"/>
-              <a:t>computador, depois do exame de código que fez. </a:t>
-            </a:r>
-            <a:r>
-              <a:rPr lang="pt-PT" sz="1400" dirty="0"/>
-              <a:t>Inscreveu-o numa plataforma de aprendizagem online, no curso de jogos de cartas. Inicialmente, o </a:t>
-            </a:r>
-            <a:r>
-              <a:rPr lang="pt-PT" sz="1400" dirty="0" smtClean="0"/>
-              <a:t>Sr. </a:t>
-            </a:r>
-            <a:r>
-              <a:rPr lang="pt-PT" sz="1400" dirty="0"/>
-              <a:t>Antunes sentiu-se confuso, assustado e sem vontade de usar a plataforma, por </a:t>
-            </a:r>
-            <a:r>
-              <a:rPr lang="pt-PT" sz="1400" dirty="0" smtClean="0"/>
-              <a:t>esta pedir </a:t>
-            </a:r>
-            <a:r>
-              <a:rPr lang="pt-PT" sz="1400" dirty="0"/>
-              <a:t>sempre </a:t>
-            </a:r>
-            <a:r>
-              <a:rPr lang="pt-PT" sz="1400" dirty="0" smtClean="0"/>
-              <a:t>para se identificar através do </a:t>
-            </a:r>
-            <a:r>
-              <a:rPr lang="pt-PT" sz="1400" dirty="0"/>
-              <a:t>login. Decidiu falar sobre essa dificuldade com a filha, que lhe ligou o login automático. Depois disto, o </a:t>
-            </a:r>
-            <a:r>
-              <a:rPr lang="pt-PT" sz="1400" dirty="0" smtClean="0"/>
-              <a:t>Sr. </a:t>
-            </a:r>
-            <a:r>
-              <a:rPr lang="pt-PT" sz="1400" dirty="0"/>
-              <a:t>Antunes começou a ficar mais interessado pela plataforma, mas continuava a ter dificuldades a ler as letras pequenas do resumo que o professor deixava na </a:t>
-            </a:r>
-            <a:r>
-              <a:rPr lang="pt-PT" sz="1400" dirty="0" smtClean="0"/>
-              <a:t>página, pois queria consultá-lo para rever as técnicas que foram ensinadas na aula. </a:t>
-            </a:r>
-            <a:r>
-              <a:rPr lang="pt-PT" sz="1400" dirty="0"/>
-              <a:t>Novamente, a sua filha ajudou-o, apontando uma função que permite regular o tamanho das </a:t>
-            </a:r>
-            <a:r>
-              <a:rPr lang="pt-PT" sz="1400" dirty="0" smtClean="0"/>
-              <a:t>letras, junto da área dos resumos. </a:t>
-            </a:r>
-            <a:r>
-              <a:rPr lang="pt-PT" sz="1400" dirty="0"/>
-              <a:t>Desta forma, o </a:t>
-            </a:r>
-            <a:r>
-              <a:rPr lang="pt-PT" sz="1400" dirty="0" smtClean="0"/>
-              <a:t>Sr. </a:t>
-            </a:r>
-            <a:r>
-              <a:rPr lang="pt-PT" sz="1400" dirty="0"/>
-              <a:t>Antunes passou a conseguir ver os resumos disponíveis na página e utilizar a plataforma </a:t>
-            </a:r>
-            <a:r>
-              <a:rPr lang="pt-PT" sz="1400" dirty="0" smtClean="0"/>
-              <a:t>normalmente. Ainda assim o Sr. Antunes liga muitas vezes à sua filha para tirar dúvidas em relação à manipulação da interface da plataforma, com “medo de errar” ou “estragar o computador”.</a:t>
+              <a:t>A filha do Sr. Antunes pensou que seria interessante o pai aprender técnicas para jogar cartas, com a esperança de que começasse a ganhar aos amigos e ficasse mais satisfeito.  Pensou em aulas pela internet, pois sabia que o pai já devia ter-se ambientado a navegar pelo computador, depois do exame de código que fez. Inscreveu-o numa plataforma de aprendizagem online, no curso de jogos de cartas. Inicialmente, o Sr. Antunes sentiu-se confuso, assustado e sem vontade de usar a plataforma, por esta pedir sempre para se identificar através do login. Decidiu falar sobre essa dificuldade com a filha, que lhe ligou o login automático. Depois disto, o Sr. Antunes começou a ficar mais interessado pela plataforma, mas continuava a ter dificuldades a ler as letras pequenas do resumo que o professor deixava na página, pois queria consultá-lo para rever as técnicas que foram ensinadas na aula. Novamente, a sua filha ajudou-o, apontando uma função que permite regular o tamanho das letras, junto da área dos resumos. Desta forma, o Sr. Antunes passou a conseguir ver os resumos disponíveis na página e utilizar a plataforma normalmente. Ainda assim o Sr. Antunes liga muitas vezes à sua filha para tirar dúvidas em relação à manipulação da interface da plataforma, com “medo de errar” ou “estragar o computador”.</a:t>
             </a:r>
             <a:endParaRPr lang="pt-PT" sz="1400" dirty="0"/>
           </a:p>
@@ -15247,7 +15087,7 @@
         </p:spPr>
         <p:txBody>
           <a:bodyPr>
-            <a:noAutofit/>
+            <a:normAutofit lnSpcReduction="10000"/>
           </a:bodyPr>
           <a:lstStyle/>
           <a:p>
@@ -15262,91 +15102,11 @@
             </a:pPr>
             <a:r>
               <a:rPr lang="pt-PT" sz="1400" dirty="0" smtClean="0"/>
-              <a:t>	A </a:t>
-            </a:r>
-            <a:r>
-              <a:rPr lang="pt-PT" sz="1400" dirty="0"/>
-              <a:t>D</a:t>
-            </a:r>
-            <a:r>
-              <a:rPr lang="pt-PT" sz="1400" dirty="0" err="1"/>
-              <a:t>ª</a:t>
-            </a:r>
-            <a:r>
-              <a:rPr lang="pt-PT" sz="1400" dirty="0"/>
-              <a:t> Mariana encontra uma plataforma de aprendizagem online e verifica que um dos cursos populares é sobre o uso do videochamadas. Verifica também que na página do curso existe uma janela de chat, onde pode falar com o instrutor. Como está habituada a usar o chat do </a:t>
-            </a:r>
-            <a:r>
-              <a:rPr lang="pt-PT" sz="1400" dirty="0" err="1"/>
-              <a:t>F</a:t>
-            </a:r>
-            <a:r>
-              <a:rPr lang="pt-PT" sz="1400" dirty="0" err="1" smtClean="0"/>
-              <a:t>acebook</a:t>
-            </a:r>
-            <a:r>
-              <a:rPr lang="pt-PT" sz="1400" dirty="0"/>
-              <a:t>, adapta-se facilmente e decide falar com o instrutor para o conhecer melhor e saber ao certo se o curso seria útil para </a:t>
-            </a:r>
-            <a:r>
-              <a:rPr lang="pt-PT" sz="1400" dirty="0" smtClean="0"/>
-              <a:t>as suas </a:t>
-            </a:r>
-            <a:r>
-              <a:rPr lang="pt-PT" sz="1400" dirty="0"/>
-              <a:t>necessidade </a:t>
-            </a:r>
-            <a:r>
-              <a:rPr lang="pt-PT" sz="1400" dirty="0" smtClean="0"/>
-              <a:t>(de </a:t>
-            </a:r>
-            <a:r>
-              <a:rPr lang="pt-PT" sz="1400" dirty="0"/>
-              <a:t>falar com os netos, que se encontram no </a:t>
-            </a:r>
-            <a:r>
-              <a:rPr lang="pt-PT" sz="1400" dirty="0" smtClean="0"/>
-              <a:t>estrangeiro). </a:t>
-            </a:r>
-            <a:r>
-              <a:rPr lang="pt-PT" sz="1400" dirty="0"/>
-              <a:t>Esse instrutor é a professora Teresa, que responde quase de imediato, e deixa a D</a:t>
-            </a:r>
-            <a:r>
-              <a:rPr lang="pt-PT" sz="1400" dirty="0" err="1"/>
-              <a:t>ª</a:t>
-            </a:r>
-            <a:r>
-              <a:rPr lang="pt-PT" sz="1400" dirty="0"/>
-              <a:t> Mariana mais à vontade quando lhe explica que o seu curso também aborda aplicações de videochamadas para </a:t>
-            </a:r>
-            <a:r>
-              <a:rPr lang="pt-PT" sz="1400" dirty="0" err="1"/>
-              <a:t>tablets</a:t>
-            </a:r>
-            <a:r>
-              <a:rPr lang="pt-PT" sz="1400" dirty="0"/>
-              <a:t>. Explicou também que todas as semanas iria publicar dois vídeos referentes ás aulas </a:t>
-            </a:r>
-            <a:r>
-              <a:rPr lang="pt-PT" sz="1400" dirty="0" smtClean="0"/>
-              <a:t>semanais, o que a D</a:t>
-            </a:r>
-            <a:r>
-              <a:rPr lang="pt-PT" sz="1400" dirty="0" err="1" smtClean="0"/>
-              <a:t>ª</a:t>
-            </a:r>
-            <a:r>
-              <a:rPr lang="pt-PT" sz="1400" dirty="0" smtClean="0"/>
-              <a:t> Mariana gostou, pois está habituada à interface dos vídeos, que vê no </a:t>
-            </a:r>
-            <a:r>
-              <a:rPr lang="pt-PT" sz="1400" dirty="0" err="1" smtClean="0"/>
-              <a:t>Facebook</a:t>
-            </a:r>
-            <a:r>
-              <a:rPr lang="pt-PT" sz="1400" dirty="0" smtClean="0"/>
-              <a:t>. </a:t>
+              <a:t>	</a:t>
+            </a:r>
+            <a:r>
+              <a:rPr lang="pt-BR" sz="1400" dirty="0"/>
+              <a:t>A Dª Mariana encontra uma plataforma de aprendizagem online e verifica que um dos cursos populares é sobre o uso do videochamadas. Verifica também que na página do curso existe uma janela de chat, onde pode falar com o instrutor. Como está habituada a usar o chat do Facebook, adapta-se facilmente e decide falar com o instrutor para o conhecer melhor e saber ao certo se o curso seria útil para as suas necessidades (de falar com os netos, que se encontram no estrangeiro). Esse instrutor é a professora Teresa, que responde quase de imediato, e deixa a Dª Mariana mais à vontade quando lhe explica que o seu curso também aborda aplicações de videochamadas para tablets. Explicou também que todas as semanas iria publicar dois vídeos referentes às aulas semanais, o que a Dª Mariana gostou, pois está habituada à interface dos vídeos, que vê no Facebook. </a:t>
             </a:r>
           </a:p>
           <a:p>
@@ -15360,58 +15120,13 @@
               <a:buNone/>
             </a:pPr>
             <a:r>
-              <a:rPr lang="pt-PT" sz="1400" dirty="0" smtClean="0"/>
+              <a:rPr lang="pt-BR" sz="1400" dirty="0" smtClean="0"/>
               <a:t>	A </a:t>
             </a:r>
             <a:r>
-              <a:rPr lang="pt-PT" sz="1400" dirty="0"/>
-              <a:t>D</a:t>
-            </a:r>
-            <a:r>
-              <a:rPr lang="pt-PT" sz="1400" dirty="0" err="1"/>
-              <a:t>ª</a:t>
-            </a:r>
-            <a:r>
-              <a:rPr lang="pt-PT" sz="1400" dirty="0"/>
-              <a:t> Mariana ficou bastante satisfeita e inscreveu-se logo no curso, que era gratuito, pois a professora Teresa pretende ajudar os idosos sem fins </a:t>
-            </a:r>
-            <a:r>
-              <a:rPr lang="pt-PT" sz="1400" dirty="0" smtClean="0"/>
-              <a:t>lucrativos, o que deixou a D</a:t>
-            </a:r>
-            <a:r>
-              <a:rPr lang="pt-PT" sz="1400" dirty="0" err="1" smtClean="0"/>
-              <a:t>ª</a:t>
-            </a:r>
-            <a:r>
-              <a:rPr lang="pt-PT" sz="1400" dirty="0" smtClean="0"/>
-              <a:t> Mariana ainda mais contente. </a:t>
-            </a:r>
-            <a:r>
-              <a:rPr lang="pt-PT" sz="1400" dirty="0"/>
-              <a:t>Todas as semanas a D</a:t>
-            </a:r>
-            <a:r>
-              <a:rPr lang="pt-PT" sz="1400" dirty="0" err="1"/>
-              <a:t>ª</a:t>
-            </a:r>
-            <a:r>
-              <a:rPr lang="pt-PT" sz="1400" dirty="0"/>
-              <a:t> Mariana acede ao curso e vê os vídeos das aulas, acede ainda ao resumo das aulas, onde a Teresa coloca dicas para o melhor uso destas aplicações e para poder rever a matéria que </a:t>
-            </a:r>
-            <a:r>
-              <a:rPr lang="pt-PT" sz="1400" dirty="0" smtClean="0"/>
-              <a:t>já foi </a:t>
-            </a:r>
-            <a:r>
-              <a:rPr lang="pt-PT" sz="1400" dirty="0" err="1" smtClean="0"/>
-              <a:t>leccionada</a:t>
-            </a:r>
-            <a:r>
-              <a:rPr lang="pt-PT" sz="1400" dirty="0" smtClean="0"/>
-              <a:t>.</a:t>
-            </a:r>
-            <a:endParaRPr lang="pt-PT" sz="1400" dirty="0"/>
+              <a:rPr lang="pt-BR" sz="1400" dirty="0"/>
+              <a:t>Dª Mariana ficou bastante satisfeita e inscreveu-se logo no curso, que era gratuito, pois a professora Teresa pretende ajudar os idosos sem fins lucrativos, o que deixou a Dª Mariana ainda mais contente. Todas as semanas a Dª Mariana acede ao curso e vê os vídeos das aulas, acede ainda ao resumo das aulas, onde a Teresa coloca dicas para o melhor uso destas aplicações e para poder rever a matéria que já foi leccionada.</a:t>
+            </a:r>
           </a:p>
           <a:p>
             <a:pPr>
@@ -15973,7 +15688,7 @@
   <a:extraClrSchemeLst/>
   <a:extLst>
     <a:ext uri="{05A4C25C-085E-4340-85A3-A5531E510DB2}">
-      <thm15:themeFamily xmlns:thm15="http://schemas.microsoft.com/office/thememl/2012/main" name="Office Theme" id="{62F939B6-93AF-4DB8-9C6B-D6C7DFDC589F}" vid="{4A3C46E8-61CC-4603-A589-7422A47A8E4A}"/>
+      <thm15:themeFamily xmlns:thm15="http://schemas.microsoft.com/office/thememl/2012/main" xmlns="" name="Office Theme" id="{62F939B6-93AF-4DB8-9C6B-D6C7DFDC589F}" vid="{4A3C46E8-61CC-4603-A589-7422A47A8E4A}"/>
     </a:ext>
   </a:extLst>
 </a:theme>

</xml_diff>